<commit_message>
Fixed to US english, added missing commas and periods
git-svn-id: http://gforge.hl7.org/svn/fhir/trunk@779 2f0db536-2c49-4257-a3fa-e771ed206c19
</commit_message>
<xml_diff>
--- a/presentations/2012 Dec Webinar/FHIR Webinar.pptx
+++ b/presentations/2012 Dec Webinar/FHIR Webinar.pptx
@@ -306,9 +306,9 @@
           <a:p>
             <a:fld id="{5D3BBE8D-782C-4EBE-9078-1E1B2F186064}" type="datetimeFigureOut">
               <a:rPr lang="en-AU" smtClean="0"/>
-              <a:t>04/12/2012</a:t>
+              <a:t>4/12/2012</a:t>
             </a:fld>
-            <a:endParaRPr lang="en-AU"/>
+            <a:endParaRPr lang="en-AU" dirty="0"/>
           </a:p>
         </p:txBody>
       </p:sp>
@@ -327,7 +327,7 @@
           <a:bodyPr/>
           <a:lstStyle/>
           <a:p>
-            <a:endParaRPr lang="en-AU"/>
+            <a:endParaRPr lang="en-AU" dirty="0"/>
           </a:p>
         </p:txBody>
       </p:sp>
@@ -350,7 +350,7 @@
               <a:rPr lang="en-AU" smtClean="0"/>
               <a:t>‹#›</a:t>
             </a:fld>
-            <a:endParaRPr lang="en-AU"/>
+            <a:endParaRPr lang="en-AU" dirty="0"/>
           </a:p>
         </p:txBody>
       </p:sp>
@@ -476,9 +476,9 @@
           <a:p>
             <a:fld id="{5D3BBE8D-782C-4EBE-9078-1E1B2F186064}" type="datetimeFigureOut">
               <a:rPr lang="en-AU" smtClean="0"/>
-              <a:t>04/12/2012</a:t>
+              <a:t>4/12/2012</a:t>
             </a:fld>
-            <a:endParaRPr lang="en-AU"/>
+            <a:endParaRPr lang="en-AU" dirty="0"/>
           </a:p>
         </p:txBody>
       </p:sp>
@@ -497,7 +497,7 @@
           <a:bodyPr/>
           <a:lstStyle/>
           <a:p>
-            <a:endParaRPr lang="en-AU"/>
+            <a:endParaRPr lang="en-AU" dirty="0"/>
           </a:p>
         </p:txBody>
       </p:sp>
@@ -520,7 +520,7 @@
               <a:rPr lang="en-AU" smtClean="0"/>
               <a:t>‹#›</a:t>
             </a:fld>
-            <a:endParaRPr lang="en-AU"/>
+            <a:endParaRPr lang="en-AU" dirty="0"/>
           </a:p>
         </p:txBody>
       </p:sp>
@@ -656,9 +656,9 @@
           <a:p>
             <a:fld id="{5D3BBE8D-782C-4EBE-9078-1E1B2F186064}" type="datetimeFigureOut">
               <a:rPr lang="en-AU" smtClean="0"/>
-              <a:t>04/12/2012</a:t>
+              <a:t>4/12/2012</a:t>
             </a:fld>
-            <a:endParaRPr lang="en-AU"/>
+            <a:endParaRPr lang="en-AU" dirty="0"/>
           </a:p>
         </p:txBody>
       </p:sp>
@@ -677,7 +677,7 @@
           <a:bodyPr/>
           <a:lstStyle/>
           <a:p>
-            <a:endParaRPr lang="en-AU"/>
+            <a:endParaRPr lang="en-AU" dirty="0"/>
           </a:p>
         </p:txBody>
       </p:sp>
@@ -700,7 +700,7 @@
               <a:rPr lang="en-AU" smtClean="0"/>
               <a:t>‹#›</a:t>
             </a:fld>
-            <a:endParaRPr lang="en-AU"/>
+            <a:endParaRPr lang="en-AU" dirty="0"/>
           </a:p>
         </p:txBody>
       </p:sp>
@@ -826,9 +826,9 @@
           <a:p>
             <a:fld id="{5D3BBE8D-782C-4EBE-9078-1E1B2F186064}" type="datetimeFigureOut">
               <a:rPr lang="en-AU" smtClean="0"/>
-              <a:t>04/12/2012</a:t>
+              <a:t>4/12/2012</a:t>
             </a:fld>
-            <a:endParaRPr lang="en-AU"/>
+            <a:endParaRPr lang="en-AU" dirty="0"/>
           </a:p>
         </p:txBody>
       </p:sp>
@@ -847,7 +847,7 @@
           <a:bodyPr/>
           <a:lstStyle/>
           <a:p>
-            <a:endParaRPr lang="en-AU"/>
+            <a:endParaRPr lang="en-AU" dirty="0"/>
           </a:p>
         </p:txBody>
       </p:sp>
@@ -870,7 +870,7 @@
               <a:rPr lang="en-AU" smtClean="0"/>
               <a:t>‹#›</a:t>
             </a:fld>
-            <a:endParaRPr lang="en-AU"/>
+            <a:endParaRPr lang="en-AU" dirty="0"/>
           </a:p>
         </p:txBody>
       </p:sp>
@@ -1072,9 +1072,9 @@
           <a:p>
             <a:fld id="{5D3BBE8D-782C-4EBE-9078-1E1B2F186064}" type="datetimeFigureOut">
               <a:rPr lang="en-AU" smtClean="0"/>
-              <a:t>04/12/2012</a:t>
+              <a:t>4/12/2012</a:t>
             </a:fld>
-            <a:endParaRPr lang="en-AU"/>
+            <a:endParaRPr lang="en-AU" dirty="0"/>
           </a:p>
         </p:txBody>
       </p:sp>
@@ -1093,7 +1093,7 @@
           <a:bodyPr/>
           <a:lstStyle/>
           <a:p>
-            <a:endParaRPr lang="en-AU"/>
+            <a:endParaRPr lang="en-AU" dirty="0"/>
           </a:p>
         </p:txBody>
       </p:sp>
@@ -1116,7 +1116,7 @@
               <a:rPr lang="en-AU" smtClean="0"/>
               <a:t>‹#›</a:t>
             </a:fld>
-            <a:endParaRPr lang="en-AU"/>
+            <a:endParaRPr lang="en-AU" dirty="0"/>
           </a:p>
         </p:txBody>
       </p:sp>
@@ -1360,9 +1360,9 @@
           <a:p>
             <a:fld id="{5D3BBE8D-782C-4EBE-9078-1E1B2F186064}" type="datetimeFigureOut">
               <a:rPr lang="en-AU" smtClean="0"/>
-              <a:t>04/12/2012</a:t>
+              <a:t>4/12/2012</a:t>
             </a:fld>
-            <a:endParaRPr lang="en-AU"/>
+            <a:endParaRPr lang="en-AU" dirty="0"/>
           </a:p>
         </p:txBody>
       </p:sp>
@@ -1381,7 +1381,7 @@
           <a:bodyPr/>
           <a:lstStyle/>
           <a:p>
-            <a:endParaRPr lang="en-AU"/>
+            <a:endParaRPr lang="en-AU" dirty="0"/>
           </a:p>
         </p:txBody>
       </p:sp>
@@ -1404,7 +1404,7 @@
               <a:rPr lang="en-AU" smtClean="0"/>
               <a:t>‹#›</a:t>
             </a:fld>
-            <a:endParaRPr lang="en-AU"/>
+            <a:endParaRPr lang="en-AU" dirty="0"/>
           </a:p>
         </p:txBody>
       </p:sp>
@@ -1782,9 +1782,9 @@
           <a:p>
             <a:fld id="{5D3BBE8D-782C-4EBE-9078-1E1B2F186064}" type="datetimeFigureOut">
               <a:rPr lang="en-AU" smtClean="0"/>
-              <a:t>04/12/2012</a:t>
+              <a:t>4/12/2012</a:t>
             </a:fld>
-            <a:endParaRPr lang="en-AU"/>
+            <a:endParaRPr lang="en-AU" dirty="0"/>
           </a:p>
         </p:txBody>
       </p:sp>
@@ -1803,7 +1803,7 @@
           <a:bodyPr/>
           <a:lstStyle/>
           <a:p>
-            <a:endParaRPr lang="en-AU"/>
+            <a:endParaRPr lang="en-AU" dirty="0"/>
           </a:p>
         </p:txBody>
       </p:sp>
@@ -1826,7 +1826,7 @@
               <a:rPr lang="en-AU" smtClean="0"/>
               <a:t>‹#›</a:t>
             </a:fld>
-            <a:endParaRPr lang="en-AU"/>
+            <a:endParaRPr lang="en-AU" dirty="0"/>
           </a:p>
         </p:txBody>
       </p:sp>
@@ -1900,9 +1900,9 @@
           <a:p>
             <a:fld id="{5D3BBE8D-782C-4EBE-9078-1E1B2F186064}" type="datetimeFigureOut">
               <a:rPr lang="en-AU" smtClean="0"/>
-              <a:t>04/12/2012</a:t>
+              <a:t>4/12/2012</a:t>
             </a:fld>
-            <a:endParaRPr lang="en-AU"/>
+            <a:endParaRPr lang="en-AU" dirty="0"/>
           </a:p>
         </p:txBody>
       </p:sp>
@@ -1921,7 +1921,7 @@
           <a:bodyPr/>
           <a:lstStyle/>
           <a:p>
-            <a:endParaRPr lang="en-AU"/>
+            <a:endParaRPr lang="en-AU" dirty="0"/>
           </a:p>
         </p:txBody>
       </p:sp>
@@ -1944,7 +1944,7 @@
               <a:rPr lang="en-AU" smtClean="0"/>
               <a:t>‹#›</a:t>
             </a:fld>
-            <a:endParaRPr lang="en-AU"/>
+            <a:endParaRPr lang="en-AU" dirty="0"/>
           </a:p>
         </p:txBody>
       </p:sp>
@@ -1995,9 +1995,9 @@
           <a:p>
             <a:fld id="{5D3BBE8D-782C-4EBE-9078-1E1B2F186064}" type="datetimeFigureOut">
               <a:rPr lang="en-AU" smtClean="0"/>
-              <a:t>04/12/2012</a:t>
+              <a:t>4/12/2012</a:t>
             </a:fld>
-            <a:endParaRPr lang="en-AU"/>
+            <a:endParaRPr lang="en-AU" dirty="0"/>
           </a:p>
         </p:txBody>
       </p:sp>
@@ -2016,7 +2016,7 @@
           <a:bodyPr/>
           <a:lstStyle/>
           <a:p>
-            <a:endParaRPr lang="en-AU"/>
+            <a:endParaRPr lang="en-AU" dirty="0"/>
           </a:p>
         </p:txBody>
       </p:sp>
@@ -2039,7 +2039,7 @@
               <a:rPr lang="en-AU" smtClean="0"/>
               <a:t>‹#›</a:t>
             </a:fld>
-            <a:endParaRPr lang="en-AU"/>
+            <a:endParaRPr lang="en-AU" dirty="0"/>
           </a:p>
         </p:txBody>
       </p:sp>
@@ -2272,9 +2272,9 @@
           <a:p>
             <a:fld id="{5D3BBE8D-782C-4EBE-9078-1E1B2F186064}" type="datetimeFigureOut">
               <a:rPr lang="en-AU" smtClean="0"/>
-              <a:t>04/12/2012</a:t>
+              <a:t>4/12/2012</a:t>
             </a:fld>
-            <a:endParaRPr lang="en-AU"/>
+            <a:endParaRPr lang="en-AU" dirty="0"/>
           </a:p>
         </p:txBody>
       </p:sp>
@@ -2293,7 +2293,7 @@
           <a:bodyPr/>
           <a:lstStyle/>
           <a:p>
-            <a:endParaRPr lang="en-AU"/>
+            <a:endParaRPr lang="en-AU" dirty="0"/>
           </a:p>
         </p:txBody>
       </p:sp>
@@ -2316,7 +2316,7 @@
               <a:rPr lang="en-AU" smtClean="0"/>
               <a:t>‹#›</a:t>
             </a:fld>
-            <a:endParaRPr lang="en-AU"/>
+            <a:endParaRPr lang="en-AU" dirty="0"/>
           </a:p>
         </p:txBody>
       </p:sp>
@@ -2439,7 +2439,7 @@
             </a:lvl9pPr>
           </a:lstStyle>
           <a:p>
-            <a:endParaRPr lang="en-AU"/>
+            <a:endParaRPr lang="en-AU" dirty="0"/>
           </a:p>
         </p:txBody>
       </p:sp>
@@ -2525,9 +2525,9 @@
           <a:p>
             <a:fld id="{5D3BBE8D-782C-4EBE-9078-1E1B2F186064}" type="datetimeFigureOut">
               <a:rPr lang="en-AU" smtClean="0"/>
-              <a:t>04/12/2012</a:t>
+              <a:t>4/12/2012</a:t>
             </a:fld>
-            <a:endParaRPr lang="en-AU"/>
+            <a:endParaRPr lang="en-AU" dirty="0"/>
           </a:p>
         </p:txBody>
       </p:sp>
@@ -2546,7 +2546,7 @@
           <a:bodyPr/>
           <a:lstStyle/>
           <a:p>
-            <a:endParaRPr lang="en-AU"/>
+            <a:endParaRPr lang="en-AU" dirty="0"/>
           </a:p>
         </p:txBody>
       </p:sp>
@@ -2569,7 +2569,7 @@
               <a:rPr lang="en-AU" smtClean="0"/>
               <a:t>‹#›</a:t>
             </a:fld>
-            <a:endParaRPr lang="en-AU"/>
+            <a:endParaRPr lang="en-AU" dirty="0"/>
           </a:p>
         </p:txBody>
       </p:sp>
@@ -2738,9 +2738,9 @@
           <a:p>
             <a:fld id="{5D3BBE8D-782C-4EBE-9078-1E1B2F186064}" type="datetimeFigureOut">
               <a:rPr lang="en-AU" smtClean="0"/>
-              <a:t>04/12/2012</a:t>
+              <a:t>4/12/2012</a:t>
             </a:fld>
-            <a:endParaRPr lang="en-AU"/>
+            <a:endParaRPr lang="en-AU" dirty="0"/>
           </a:p>
         </p:txBody>
       </p:sp>
@@ -2777,7 +2777,7 @@
             </a:lvl1pPr>
           </a:lstStyle>
           <a:p>
-            <a:endParaRPr lang="en-AU"/>
+            <a:endParaRPr lang="en-AU" dirty="0"/>
           </a:p>
         </p:txBody>
       </p:sp>
@@ -2818,7 +2818,7 @@
               <a:rPr lang="en-AU" smtClean="0"/>
               <a:t>‹#›</a:t>
             </a:fld>
-            <a:endParaRPr lang="en-AU"/>
+            <a:endParaRPr lang="en-AU" dirty="0"/>
           </a:p>
         </p:txBody>
       </p:sp>
@@ -3298,15 +3298,7 @@
             </a:r>
             <a:r>
               <a:rPr lang="en-AU" dirty="0" smtClean="0"/>
-              <a:t>lassic HTTP </a:t>
-            </a:r>
-            <a:r>
-              <a:rPr lang="en-AU" dirty="0" err="1" smtClean="0"/>
-              <a:t>RESTful</a:t>
-            </a:r>
-            <a:r>
-              <a:rPr lang="en-AU" dirty="0" smtClean="0"/>
-              <a:t> approach</a:t>
+              <a:t>lassic HTTP RESTful approach</a:t>
             </a:r>
           </a:p>
           <a:p>
@@ -3321,11 +3313,11 @@
             </a:r>
             <a:r>
               <a:rPr lang="en-AU" dirty="0" smtClean="0"/>
-              <a:t>acebook, Twitter </a:t>
-            </a:r>
-            <a:r>
-              <a:rPr lang="en-AU" dirty="0" err="1" smtClean="0"/>
-              <a:t>etc</a:t>
+              <a:t>acebook, </a:t>
+            </a:r>
+            <a:r>
+              <a:rPr lang="en-AU" dirty="0" smtClean="0"/>
+              <a:t>Twitter, etc.</a:t>
             </a:r>
             <a:endParaRPr lang="en-AU" dirty="0" smtClean="0"/>
           </a:p>
@@ -3346,24 +3338,15 @@
             <a:pPr lvl="1"/>
             <a:r>
               <a:rPr lang="en-AU" dirty="0" smtClean="0"/>
-              <a:t>Pub/sub framework, Multi-resource </a:t>
-            </a:r>
-            <a:r>
-              <a:rPr lang="en-AU" dirty="0" smtClean="0"/>
-              <a:t>Transactions</a:t>
+              <a:t>Pub/sub framework, Multi-resource Transactions</a:t>
             </a:r>
           </a:p>
           <a:p>
             <a:pPr lvl="1"/>
             <a:r>
               <a:rPr lang="en-AU" dirty="0" smtClean="0"/>
-              <a:t>Messages (v2-like), Documents (</a:t>
-            </a:r>
-            <a:r>
-              <a:rPr lang="en-AU" dirty="0" smtClean="0"/>
-              <a:t>per CDA)</a:t>
-            </a:r>
-            <a:endParaRPr lang="en-AU" dirty="0" smtClean="0"/>
+              <a:t>Messages (v2-like), Documents (per CDA)</a:t>
+            </a:r>
           </a:p>
           <a:p>
             <a:r>
@@ -3384,7 +3367,6 @@
               <a:rPr lang="en-AU" dirty="0" smtClean="0"/>
               <a:t>Same base rules</a:t>
             </a:r>
-            <a:endParaRPr lang="en-AU" dirty="0" smtClean="0"/>
           </a:p>
           <a:p>
             <a:endParaRPr lang="en-AU" dirty="0"/>
@@ -3517,11 +3499,11 @@
             <a:pPr lvl="1"/>
             <a:r>
               <a:rPr lang="en-AU" dirty="0" smtClean="0"/>
-              <a:t>HTTP, conformance, JSON </a:t>
-            </a:r>
-            <a:r>
-              <a:rPr lang="en-AU" dirty="0" err="1" smtClean="0"/>
-              <a:t>etc</a:t>
+              <a:t>HTTP, conformance, </a:t>
+            </a:r>
+            <a:r>
+              <a:rPr lang="en-AU" dirty="0" smtClean="0"/>
+              <a:t>JSON, etc.</a:t>
             </a:r>
             <a:endParaRPr lang="en-AU" dirty="0" smtClean="0"/>
           </a:p>
@@ -3622,7 +3604,7 @@
           <a:bodyPr/>
           <a:lstStyle/>
           <a:p>
-            <a:endParaRPr lang="en-AU"/>
+            <a:endParaRPr lang="en-AU" dirty="0"/>
           </a:p>
         </p:txBody>
       </p:sp>
@@ -3641,7 +3623,7 @@
           <a:bodyPr/>
           <a:lstStyle/>
           <a:p>
-            <a:endParaRPr lang="en-AU"/>
+            <a:endParaRPr lang="en-AU" dirty="0"/>
           </a:p>
         </p:txBody>
       </p:sp>
@@ -3761,7 +3743,7 @@
           <a:bodyPr/>
           <a:lstStyle/>
           <a:p>
-            <a:endParaRPr lang="en-AU"/>
+            <a:endParaRPr lang="en-AU" dirty="0"/>
           </a:p>
         </p:txBody>
       </p:sp>
@@ -3780,7 +3762,7 @@
           <a:bodyPr/>
           <a:lstStyle/>
           <a:p>
-            <a:endParaRPr lang="en-AU"/>
+            <a:endParaRPr lang="en-AU" dirty="0"/>
           </a:p>
         </p:txBody>
       </p:sp>
@@ -3963,10 +3945,9 @@
           <a:p>
             <a:pPr lvl="1"/>
             <a:r>
-              <a:rPr lang="en-AU" dirty="0" err="1" smtClean="0"/>
+              <a:rPr lang="en-AU" dirty="0" smtClean="0"/>
               <a:t>Connectathon</a:t>
             </a:r>
-            <a:endParaRPr lang="en-AU" dirty="0" smtClean="0"/>
           </a:p>
           <a:p>
             <a:r>
@@ -3990,7 +3971,6 @@
               <a:rPr lang="en-AU" dirty="0" smtClean="0"/>
               <a:t>Unencumbered – free for anyone to use</a:t>
             </a:r>
-            <a:endParaRPr lang="en-AU" dirty="0" smtClean="0"/>
           </a:p>
           <a:p>
             <a:endParaRPr lang="en-AU" dirty="0"/>
@@ -4306,21 +4286,8 @@
             </a:r>
             <a:r>
               <a:rPr lang="en-AU" dirty="0" smtClean="0"/>
-              <a:t>nterested in </a:t>
-            </a:r>
-            <a:r>
-              <a:rPr lang="en-AU" dirty="0" smtClean="0"/>
-              <a:t>using FHIR for </a:t>
-            </a:r>
-            <a:r>
-              <a:rPr lang="en-AU" dirty="0" err="1" smtClean="0"/>
-              <a:t>RESTful</a:t>
-            </a:r>
-            <a:r>
-              <a:rPr lang="en-AU" dirty="0" smtClean="0"/>
-              <a:t> access to image metadata</a:t>
-            </a:r>
-            <a:endParaRPr lang="en-AU" dirty="0" smtClean="0"/>
+              <a:t>nterested in using FHIR for RESTful access to image metadata</a:t>
+            </a:r>
           </a:p>
           <a:p>
             <a:r>
@@ -4334,7 +4301,6 @@
               <a:rPr lang="en-AU" dirty="0" smtClean="0"/>
               <a:t>Semantic health group helping us with RDF</a:t>
             </a:r>
-            <a:endParaRPr lang="en-AU" dirty="0" smtClean="0"/>
           </a:p>
           <a:p>
             <a:r>
@@ -4700,11 +4666,7 @@
             <a:pPr lvl="1"/>
             <a:r>
               <a:rPr lang="en-AU" dirty="0" smtClean="0"/>
-              <a:t>Try </a:t>
-            </a:r>
-            <a:r>
-              <a:rPr lang="en-AU" dirty="0" smtClean="0"/>
-              <a:t>implementing it</a:t>
+              <a:t>Try implementing it</a:t>
             </a:r>
           </a:p>
           <a:p>
@@ -4714,8 +4676,12 @@
               <a:t>Come to the </a:t>
             </a:r>
             <a:r>
-              <a:rPr lang="en-AU" dirty="0" err="1" smtClean="0"/>
-              <a:t>connectathon</a:t>
+              <a:rPr lang="en-AU" dirty="0"/>
+              <a:t>C</a:t>
+            </a:r>
+            <a:r>
+              <a:rPr lang="en-AU" dirty="0" smtClean="0"/>
+              <a:t>onnectathon</a:t>
             </a:r>
             <a:r>
               <a:rPr lang="en-AU" dirty="0" smtClean="0"/>
@@ -5058,7 +5024,6 @@
               <a:rPr lang="en-AU" dirty="0" smtClean="0"/>
               <a:t>	…insert your fire related joke here….</a:t>
             </a:r>
-            <a:endParaRPr lang="en-AU" dirty="0" smtClean="0"/>
           </a:p>
           <a:p>
             <a:endParaRPr lang="en-AU" dirty="0"/>
@@ -5190,11 +5155,7 @@
             </a:br>
             <a:r>
               <a:rPr lang="en-AU" dirty="0" smtClean="0"/>
-              <a:t>“What </a:t>
-            </a:r>
-            <a:r>
-              <a:rPr lang="en-AU" dirty="0" smtClean="0"/>
-              <a:t>would interoperability look like if we started afresh”</a:t>
+              <a:t>“What would interoperability look like if we started afresh”</a:t>
             </a:r>
           </a:p>
           <a:p>
@@ -5230,7 +5191,6 @@
               <a:rPr lang="en-AU" dirty="0" smtClean="0"/>
               <a:t>Different approaches not reconciled</a:t>
             </a:r>
-            <a:endParaRPr lang="en-AU" dirty="0" smtClean="0"/>
           </a:p>
           <a:p>
             <a:endParaRPr lang="en-AU" dirty="0"/>
@@ -5355,15 +5315,7 @@
           <a:p>
             <a:r>
               <a:rPr lang="en-AU" dirty="0" smtClean="0"/>
-              <a:t>Web search for success markers led to </a:t>
-            </a:r>
-            <a:r>
-              <a:rPr lang="en-AU" dirty="0" err="1" smtClean="0"/>
-              <a:t>RESTful</a:t>
-            </a:r>
-            <a:r>
-              <a:rPr lang="en-AU" dirty="0" smtClean="0"/>
-              <a:t> based APIs</a:t>
+              <a:t>Web search for success markers led to RESTful based APIs</a:t>
             </a:r>
           </a:p>
           <a:p>
@@ -5373,7 +5325,7 @@
               <a:t>Exemplar: </a:t>
             </a:r>
             <a:r>
-              <a:rPr lang="en-AU" dirty="0" err="1" smtClean="0"/>
+              <a:rPr lang="en-AU" dirty="0" smtClean="0"/>
               <a:t>Highrise</a:t>
             </a:r>
             <a:r>
@@ -5705,7 +5657,19 @@
             <a:pPr lvl="1"/>
             <a:r>
               <a:rPr lang="en-AU" dirty="0" smtClean="0"/>
-              <a:t>Person, Patient, Organisation, Device, Facility</a:t>
+              <a:t>Person, Patient, </a:t>
+            </a:r>
+            <a:r>
+              <a:rPr lang="en-US" dirty="0" smtClean="0"/>
+              <a:t>Organization</a:t>
+            </a:r>
+            <a:r>
+              <a:rPr lang="en-AU" dirty="0" smtClean="0"/>
+              <a:t>, </a:t>
+            </a:r>
+            <a:r>
+              <a:rPr lang="en-AU" dirty="0" smtClean="0"/>
+              <a:t>Device, Facility</a:t>
             </a:r>
           </a:p>
           <a:p>
@@ -5715,8 +5679,8 @@
               <a:t>Coverage, Invoice, </a:t>
             </a:r>
             <a:r>
-              <a:rPr lang="en-AU" dirty="0" err="1" smtClean="0"/>
-              <a:t>etc</a:t>
+              <a:rPr lang="en-AU" dirty="0" smtClean="0"/>
+              <a:t>etc.</a:t>
             </a:r>
             <a:endParaRPr lang="en-AU" dirty="0"/>
           </a:p>
@@ -5920,7 +5884,6 @@
               <a:rPr lang="en-AU" dirty="0" smtClean="0"/>
               <a:t>Published and managed</a:t>
             </a:r>
-            <a:endParaRPr lang="en-AU" dirty="0" smtClean="0"/>
           </a:p>
           <a:p>
             <a:r>
@@ -6168,7 +6131,7 @@
           <a:lstStyle/>
           <a:p>
             <a:pPr algn="ctr"/>
-            <a:endParaRPr lang="en-AU"/>
+            <a:endParaRPr lang="en-AU" dirty="0"/>
           </a:p>
         </p:txBody>
       </p:sp>
@@ -6214,7 +6177,7 @@
           <a:lstStyle/>
           <a:p>
             <a:pPr algn="ctr"/>
-            <a:endParaRPr lang="en-AU"/>
+            <a:endParaRPr lang="en-AU" dirty="0"/>
           </a:p>
         </p:txBody>
       </p:sp>
@@ -6260,7 +6223,7 @@
           <a:lstStyle/>
           <a:p>
             <a:pPr algn="ctr"/>
-            <a:endParaRPr lang="en-AU"/>
+            <a:endParaRPr lang="en-AU" dirty="0"/>
           </a:p>
         </p:txBody>
       </p:sp>
@@ -6400,7 +6363,6 @@
               <a:rPr lang="en-AU" dirty="0" smtClean="0"/>
               <a:t>Published and managed</a:t>
             </a:r>
-            <a:endParaRPr lang="en-AU" dirty="0" smtClean="0"/>
           </a:p>
           <a:p>
             <a:r>

</xml_diff>